<commit_message>
Commit wit addition of Mastering BC rogramming
</commit_message>
<xml_diff>
--- a/BlockChain/DeFi Presentations/Flash Loan and DEX.pptx
+++ b/BlockChain/DeFi Presentations/Flash Loan and DEX.pptx
@@ -210,7 +210,7 @@
           <a:p>
             <a:fld id="{3F167ABD-6206-463A-A4A7-89C272135100}" type="datetimeFigureOut">
               <a:rPr lang="en-US" smtClean="0"/>
-              <a:t>8/24/2021</a:t>
+              <a:t>10/7/2021</a:t>
             </a:fld>
             <a:endParaRPr lang="en-US"/>
           </a:p>
@@ -1525,7 +1525,7 @@
           <a:p>
             <a:fld id="{BEC897DE-996B-4AF6-A9D8-6E24109B0997}" type="datetimeFigureOut">
               <a:rPr lang="en-US" smtClean="0"/>
-              <a:t>8/24/2021</a:t>
+              <a:t>10/7/2021</a:t>
             </a:fld>
             <a:endParaRPr lang="en-US"/>
           </a:p>
@@ -1792,7 +1792,7 @@
           <a:p>
             <a:fld id="{BEC897DE-996B-4AF6-A9D8-6E24109B0997}" type="datetimeFigureOut">
               <a:rPr lang="en-US" smtClean="0"/>
-              <a:t>8/24/2021</a:t>
+              <a:t>10/7/2021</a:t>
             </a:fld>
             <a:endParaRPr lang="en-US"/>
           </a:p>
@@ -2061,7 +2061,7 @@
           <a:p>
             <a:fld id="{BEC897DE-996B-4AF6-A9D8-6E24109B0997}" type="datetimeFigureOut">
               <a:rPr lang="en-US" smtClean="0"/>
-              <a:t>8/24/2021</a:t>
+              <a:t>10/7/2021</a:t>
             </a:fld>
             <a:endParaRPr lang="en-US"/>
           </a:p>
@@ -2328,7 +2328,7 @@
           <a:p>
             <a:fld id="{BEC897DE-996B-4AF6-A9D8-6E24109B0997}" type="datetimeFigureOut">
               <a:rPr lang="en-US" smtClean="0"/>
-              <a:t>8/24/2021</a:t>
+              <a:t>10/7/2021</a:t>
             </a:fld>
             <a:endParaRPr lang="en-US"/>
           </a:p>
@@ -2663,7 +2663,7 @@
           <a:p>
             <a:fld id="{BEC897DE-996B-4AF6-A9D8-6E24109B0997}" type="datetimeFigureOut">
               <a:rPr lang="en-US" smtClean="0"/>
-              <a:t>8/24/2021</a:t>
+              <a:t>10/7/2021</a:t>
             </a:fld>
             <a:endParaRPr lang="en-US"/>
           </a:p>
@@ -3048,7 +3048,7 @@
           <a:p>
             <a:fld id="{BEC897DE-996B-4AF6-A9D8-6E24109B0997}" type="datetimeFigureOut">
               <a:rPr lang="en-US" smtClean="0"/>
-              <a:t>8/24/2021</a:t>
+              <a:t>10/7/2021</a:t>
             </a:fld>
             <a:endParaRPr lang="en-US"/>
           </a:p>
@@ -3563,7 +3563,7 @@
           <a:p>
             <a:fld id="{BEC897DE-996B-4AF6-A9D8-6E24109B0997}" type="datetimeFigureOut">
               <a:rPr lang="en-US" smtClean="0"/>
-              <a:t>8/24/2021</a:t>
+              <a:t>10/7/2021</a:t>
             </a:fld>
             <a:endParaRPr lang="en-US"/>
           </a:p>
@@ -3778,7 +3778,7 @@
           <a:p>
             <a:fld id="{BEC897DE-996B-4AF6-A9D8-6E24109B0997}" type="datetimeFigureOut">
               <a:rPr lang="en-US" smtClean="0"/>
-              <a:t>8/24/2021</a:t>
+              <a:t>10/7/2021</a:t>
             </a:fld>
             <a:endParaRPr lang="en-US"/>
           </a:p>
@@ -3962,7 +3962,7 @@
           <a:p>
             <a:fld id="{BEC897DE-996B-4AF6-A9D8-6E24109B0997}" type="datetimeFigureOut">
               <a:rPr lang="en-US" smtClean="0"/>
-              <a:t>8/24/2021</a:t>
+              <a:t>10/7/2021</a:t>
             </a:fld>
             <a:endParaRPr lang="en-US"/>
           </a:p>
@@ -4332,7 +4332,7 @@
           <a:p>
             <a:fld id="{BEC897DE-996B-4AF6-A9D8-6E24109B0997}" type="datetimeFigureOut">
               <a:rPr lang="en-US" smtClean="0"/>
-              <a:t>8/24/2021</a:t>
+              <a:t>10/7/2021</a:t>
             </a:fld>
             <a:endParaRPr lang="en-US"/>
           </a:p>
@@ -4633,7 +4633,7 @@
           <a:p>
             <a:fld id="{BEC897DE-996B-4AF6-A9D8-6E24109B0997}" type="datetimeFigureOut">
               <a:rPr lang="en-US" smtClean="0"/>
-              <a:t>8/24/2021</a:t>
+              <a:t>10/7/2021</a:t>
             </a:fld>
             <a:endParaRPr lang="en-US"/>
           </a:p>
@@ -4935,7 +4935,7 @@
           <a:p>
             <a:fld id="{BEC897DE-996B-4AF6-A9D8-6E24109B0997}" type="datetimeFigureOut">
               <a:rPr lang="en-US" smtClean="0"/>
-              <a:t>8/24/2021</a:t>
+              <a:t>10/7/2021</a:t>
             </a:fld>
             <a:endParaRPr lang="en-US"/>
           </a:p>
@@ -5418,11 +5418,7 @@
           <a:p>
             <a:r>
               <a:rPr lang="en-US" sz="3600" dirty="0" smtClean="0"/>
-              <a:t>Flash </a:t>
-            </a:r>
-            <a:r>
-              <a:rPr lang="en-US" sz="3600" dirty="0" smtClean="0"/>
-              <a:t>Loan</a:t>
+              <a:t>Flash Loan</a:t>
             </a:r>
             <a:br>
               <a:rPr lang="en-US" sz="3600" dirty="0" smtClean="0"/>
@@ -5439,8 +5435,22 @@
               <a:t>Decentralized </a:t>
             </a:r>
             <a:r>
-              <a:rPr lang="en-US" sz="3600" dirty="0"/>
+              <a:rPr lang="en-US" sz="3600" dirty="0" smtClean="0"/>
               <a:t>Exchanges</a:t>
+            </a:r>
+            <a:br>
+              <a:rPr lang="en-US" sz="3600" dirty="0" smtClean="0"/>
+            </a:br>
+            <a:r>
+              <a:rPr lang="en-US" sz="3600" dirty="0" smtClean="0"/>
+              <a:t/>
+            </a:r>
+            <a:br>
+              <a:rPr lang="en-US" sz="3600" dirty="0" smtClean="0"/>
+            </a:br>
+            <a:r>
+              <a:rPr lang="en-US" sz="3600" dirty="0" smtClean="0"/>
+              <a:t> Noman ul Haq</a:t>
             </a:r>
             <a:endParaRPr lang="en-US" sz="3600" dirty="0">
               <a:solidFill>
@@ -5465,6 +5475,13 @@
           <a:bodyPr/>
           <a:lstStyle/>
           <a:p>
+            <a:endParaRPr lang="en-US" altLang="en-US" b="1" dirty="0" smtClean="0">
+              <a:solidFill>
+                <a:srgbClr val="00B050"/>
+              </a:solidFill>
+            </a:endParaRPr>
+          </a:p>
+          <a:p>
             <a:r>
               <a:rPr lang="en-US" altLang="en-US" b="1" dirty="0" smtClean="0">
                 <a:solidFill>
@@ -5473,6 +5490,11 @@
               </a:rPr>
               <a:t>24/08/2021</a:t>
             </a:r>
+            <a:endParaRPr lang="en-US" altLang="en-US" b="1" dirty="0" smtClean="0">
+              <a:solidFill>
+                <a:srgbClr val="00B050"/>
+              </a:solidFill>
+            </a:endParaRPr>
           </a:p>
           <a:p>
             <a:endParaRPr lang="en-US" dirty="0"/>

</xml_diff>